<commit_message>
adding notes fot git rebase and git gui
</commit_message>
<xml_diff>
--- a/ppt/9.What+is+SourceTree.pptx
+++ b/ppt/9.What+is+SourceTree.pptx
@@ -210,7 +210,7 @@
           <a:effectLst/>
           <a:extLst>
             <a:ext uri="{91240B29-F687-4f45-9708-019B960494DF}">
-              <a14:hiddenLine xmlns:a14="http://schemas.microsoft.com/office/drawing/2010/main" xmlns="" w="9525">
+              <a14:hiddenLine xmlns="" xmlns:a14="http://schemas.microsoft.com/office/drawing/2010/main" w="9525">
                 <a:solidFill>
                   <a:srgbClr val="000000"/>
                 </a:solidFill>
@@ -403,7 +403,7 @@
             <a:fld id="{08B9EBBA-996F-894A-B54A-D6246ED52CEA}" type="datetimeFigureOut">
               <a:rPr lang="en-US" dirty="0"/>
               <a:pPr/>
-              <a:t>9/8/2018</a:t>
+              <a:t>8/2/2020</a:t>
             </a:fld>
             <a:endParaRPr lang="en-US" dirty="0"/>
           </a:p>
@@ -718,7 +718,7 @@
             <a:fld id="{18C79C5D-2A6F-F04D-97DA-BEF2467B64E4}" type="datetimeFigureOut">
               <a:rPr lang="en-US" dirty="0"/>
               <a:pPr/>
-              <a:t>9/8/2018</a:t>
+              <a:t>8/2/2020</a:t>
             </a:fld>
             <a:endParaRPr lang="en-US" dirty="0"/>
           </a:p>
@@ -1203,7 +1203,7 @@
             <a:fld id="{8DFA1846-DA80-1C48-A609-854EA85C59AD}" type="datetimeFigureOut">
               <a:rPr lang="en-US" dirty="0"/>
               <a:pPr/>
-              <a:t>9/8/2018</a:t>
+              <a:t>8/2/2020</a:t>
             </a:fld>
             <a:endParaRPr lang="en-US" dirty="0"/>
           </a:p>
@@ -1569,7 +1569,7 @@
             <a:fld id="{FBF54567-0DE4-3F47-BF90-CB84690072F9}" type="datetimeFigureOut">
               <a:rPr lang="en-US" dirty="0"/>
               <a:pPr/>
-              <a:t>9/8/2018</a:t>
+              <a:t>8/2/2020</a:t>
             </a:fld>
             <a:endParaRPr lang="en-US" dirty="0"/>
           </a:p>
@@ -1720,7 +1720,7 @@
           <a:ln/>
           <a:extLst>
             <a:ext uri="{91240B29-F687-4f45-9708-019B960494DF}">
-              <a14:hiddenLine xmlns:a14="http://schemas.microsoft.com/office/drawing/2010/main" xmlns="" w="9525">
+              <a14:hiddenLine xmlns="" xmlns:a14="http://schemas.microsoft.com/office/drawing/2010/main" w="9525">
                 <a:solidFill>
                   <a:srgbClr val="000000"/>
                 </a:solidFill>
@@ -1839,7 +1839,7 @@
             <a:fld id="{C6C52C72-DE31-F449-A4ED-4C594FD91407}" type="datetimeFigureOut">
               <a:rPr lang="en-US" dirty="0"/>
               <a:pPr/>
-              <a:t>9/8/2018</a:t>
+              <a:t>8/2/2020</a:t>
             </a:fld>
             <a:endParaRPr lang="en-US" dirty="0"/>
           </a:p>
@@ -1992,7 +1992,7 @@
           <a:ln/>
           <a:extLst>
             <a:ext uri="{91240B29-F687-4f45-9708-019B960494DF}">
-              <a14:hiddenLine xmlns:a14="http://schemas.microsoft.com/office/drawing/2010/main" xmlns="" w="9525">
+              <a14:hiddenLine xmlns="" xmlns:a14="http://schemas.microsoft.com/office/drawing/2010/main" w="9525">
                 <a:solidFill>
                   <a:srgbClr val="000000"/>
                 </a:solidFill>
@@ -2121,7 +2121,7 @@
             <a:fld id="{ED62726E-379B-B349-9EED-81ED093FA806}" type="datetimeFigureOut">
               <a:rPr lang="en-US" dirty="0"/>
               <a:pPr/>
-              <a:t>9/8/2018</a:t>
+              <a:t>8/2/2020</a:t>
             </a:fld>
             <a:endParaRPr lang="en-US" dirty="0"/>
           </a:p>
@@ -2272,7 +2272,7 @@
           <a:ln/>
           <a:extLst>
             <a:ext uri="{91240B29-F687-4f45-9708-019B960494DF}">
-              <a14:hiddenLine xmlns:a14="http://schemas.microsoft.com/office/drawing/2010/main" xmlns="" w="9525">
+              <a14:hiddenLine xmlns="" xmlns:a14="http://schemas.microsoft.com/office/drawing/2010/main" w="9525">
                 <a:solidFill>
                   <a:srgbClr val="000000"/>
                 </a:solidFill>
@@ -2401,7 +2401,7 @@
             <a:fld id="{9B3A1323-8D79-1946-B0D7-40001CF92E9D}" type="datetimeFigureOut">
               <a:rPr lang="en-US" dirty="0"/>
               <a:pPr/>
-              <a:t>9/8/2018</a:t>
+              <a:t>8/2/2020</a:t>
             </a:fld>
             <a:endParaRPr lang="en-US" dirty="0"/>
           </a:p>
@@ -2741,7 +2741,7 @@
             <a:fld id="{8DFA1846-DA80-1C48-A609-854EA85C59AD}" type="datetimeFigureOut">
               <a:rPr lang="en-US" dirty="0"/>
               <a:pPr/>
-              <a:t>9/8/2018</a:t>
+              <a:t>8/2/2020</a:t>
             </a:fld>
             <a:endParaRPr lang="en-US" dirty="0"/>
           </a:p>
@@ -2892,7 +2892,7 @@
           <a:ln/>
           <a:extLst>
             <a:ext uri="{91240B29-F687-4f45-9708-019B960494DF}">
-              <a14:hiddenLine xmlns:a14="http://schemas.microsoft.com/office/drawing/2010/main" xmlns="" w="9525">
+              <a14:hiddenLine xmlns="" xmlns:a14="http://schemas.microsoft.com/office/drawing/2010/main" w="9525">
                 <a:solidFill>
                   <a:srgbClr val="000000"/>
                 </a:solidFill>
@@ -3077,7 +3077,7 @@
             <a:fld id="{57302355-E14B-8545-A8F8-0FE83CC9D524}" type="datetimeFigureOut">
               <a:rPr lang="en-US" dirty="0"/>
               <a:pPr/>
-              <a:t>9/8/2018</a:t>
+              <a:t>8/2/2020</a:t>
             </a:fld>
             <a:endParaRPr lang="en-US" dirty="0"/>
           </a:p>
@@ -3228,7 +3228,7 @@
           <a:ln/>
           <a:extLst>
             <a:ext uri="{91240B29-F687-4f45-9708-019B960494DF}">
-              <a14:hiddenLine xmlns:a14="http://schemas.microsoft.com/office/drawing/2010/main" xmlns="" w="9525">
+              <a14:hiddenLine xmlns="" xmlns:a14="http://schemas.microsoft.com/office/drawing/2010/main" w="9525">
                 <a:solidFill>
                   <a:srgbClr val="000000"/>
                 </a:solidFill>
@@ -3551,7 +3551,7 @@
             <a:fld id="{02640F58-564D-2B4F-AE67-E407BA4FCF45}" type="datetimeFigureOut">
               <a:rPr lang="en-US" dirty="0"/>
               <a:pPr/>
-              <a:t>9/8/2018</a:t>
+              <a:t>8/2/2020</a:t>
             </a:fld>
             <a:endParaRPr lang="en-US" dirty="0"/>
           </a:p>
@@ -3702,7 +3702,7 @@
           <a:ln/>
           <a:extLst>
             <a:ext uri="{91240B29-F687-4f45-9708-019B960494DF}">
-              <a14:hiddenLine xmlns:a14="http://schemas.microsoft.com/office/drawing/2010/main" xmlns="" w="9525">
+              <a14:hiddenLine xmlns="" xmlns:a14="http://schemas.microsoft.com/office/drawing/2010/main" w="9525">
                 <a:solidFill>
                   <a:srgbClr val="000000"/>
                 </a:solidFill>
@@ -3769,7 +3769,7 @@
             <a:fld id="{F13A34C8-038E-2045-AF43-DF7DBB8E0E9E}" type="datetimeFigureOut">
               <a:rPr lang="en-US" dirty="0"/>
               <a:pPr/>
-              <a:t>9/8/2018</a:t>
+              <a:t>8/2/2020</a:t>
             </a:fld>
             <a:endParaRPr lang="en-US" dirty="0"/>
           </a:p>
@@ -3861,7 +3861,7 @@
             <a:fld id="{8818C68F-D26B-8F47-958C-23B49CF8A634}" type="datetimeFigureOut">
               <a:rPr lang="en-US" dirty="0"/>
               <a:pPr/>
-              <a:t>9/8/2018</a:t>
+              <a:t>8/2/2020</a:t>
             </a:fld>
             <a:endParaRPr lang="en-US" dirty="0"/>
           </a:p>
@@ -4125,7 +4125,7 @@
           <a:ln/>
           <a:extLst>
             <a:ext uri="{91240B29-F687-4f45-9708-019B960494DF}">
-              <a14:hiddenLine xmlns:a14="http://schemas.microsoft.com/office/drawing/2010/main" xmlns="" w="9525">
+              <a14:hiddenLine xmlns="" xmlns:a14="http://schemas.microsoft.com/office/drawing/2010/main" w="9525">
                 <a:solidFill>
                   <a:srgbClr val="000000"/>
                 </a:solidFill>
@@ -4325,7 +4325,7 @@
             <a:fld id="{D0DF5E60-9974-AC48-9591-99C2BB44B7CF}" type="datetimeFigureOut">
               <a:rPr lang="en-US" dirty="0"/>
               <a:pPr/>
-              <a:t>9/8/2018</a:t>
+              <a:t>8/2/2020</a:t>
             </a:fld>
             <a:endParaRPr lang="en-US" dirty="0"/>
           </a:p>
@@ -4635,7 +4635,7 @@
             <a:fld id="{18C79C5D-2A6F-F04D-97DA-BEF2467B64E4}" type="datetimeFigureOut">
               <a:rPr lang="en-US" dirty="0"/>
               <a:pPr/>
-              <a:t>9/8/2018</a:t>
+              <a:t>8/2/2020</a:t>
             </a:fld>
             <a:endParaRPr lang="en-US" dirty="0"/>
           </a:p>
@@ -4902,7 +4902,7 @@
             <a:fld id="{09B482E8-6E0E-1B4F-B1FD-C69DB9E858D9}" type="datetimeFigureOut">
               <a:rPr lang="en-US" dirty="0"/>
               <a:pPr/>
-              <a:t>9/8/2018</a:t>
+              <a:t>8/2/2020</a:t>
             </a:fld>
             <a:endParaRPr lang="en-US" dirty="0"/>
           </a:p>
@@ -5390,7 +5390,19 @@
           <a:bodyPr/>
           <a:lstStyle/>
           <a:p>
-            <a:endParaRPr lang="en-GB"/>
+            <a:r>
+              <a:rPr lang="en-GB" dirty="0" smtClean="0"/>
+              <a:t>Anuranjan Srivastava(</a:t>
+            </a:r>
+            <a:r>
+              <a:rPr lang="en-GB" dirty="0" err="1" smtClean="0"/>
+              <a:t>Codersaty</a:t>
+            </a:r>
+            <a:r>
+              <a:rPr lang="en-GB" dirty="0" smtClean="0"/>
+              <a:t>)</a:t>
+            </a:r>
+            <a:endParaRPr lang="en-GB" dirty="0"/>
           </a:p>
         </p:txBody>
       </p:sp>

</xml_diff>